<commit_message>
added chapter 9 and notebook
</commit_message>
<xml_diff>
--- a/tex/figures/figures.pptx
+++ b/tex/figures/figures.pptx
@@ -7,6 +7,7 @@
   <p:sldIdLst>
     <p:sldId id="256" r:id="rId2"/>
     <p:sldId id="257" r:id="rId3"/>
+    <p:sldId id="258" r:id="rId4"/>
   </p:sldIdLst>
   <p:sldSz cx="12192000" cy="6858000"/>
   <p:notesSz cx="6858000" cy="9144000"/>
@@ -105,6 +106,11 @@
       </a:defRPr>
     </a:lvl9pPr>
   </p:defaultTextStyle>
+  <p:extLst>
+    <p:ext uri="{EFAFB233-063F-42B5-8137-9DF3F51BA10A}">
+      <p15:sldGuideLst xmlns:p15="http://schemas.microsoft.com/office/powerpoint/2012/main"/>
+    </p:ext>
+  </p:extLst>
 </p:presentation>
 </file>
 
@@ -239,7 +245,7 @@
           <a:p>
             <a:fld id="{E48D0C65-1297-4A36-9678-3688A302B186}" type="datetimeFigureOut">
               <a:rPr lang="en-US" smtClean="0"/>
-              <a:t>11/3/2015</a:t>
+              <a:t>2/15/2016</a:t>
             </a:fld>
             <a:endParaRPr lang="en-US"/>
           </a:p>
@@ -409,7 +415,7 @@
           <a:p>
             <a:fld id="{E48D0C65-1297-4A36-9678-3688A302B186}" type="datetimeFigureOut">
               <a:rPr lang="en-US" smtClean="0"/>
-              <a:t>11/3/2015</a:t>
+              <a:t>2/15/2016</a:t>
             </a:fld>
             <a:endParaRPr lang="en-US"/>
           </a:p>
@@ -589,7 +595,7 @@
           <a:p>
             <a:fld id="{E48D0C65-1297-4A36-9678-3688A302B186}" type="datetimeFigureOut">
               <a:rPr lang="en-US" smtClean="0"/>
-              <a:t>11/3/2015</a:t>
+              <a:t>2/15/2016</a:t>
             </a:fld>
             <a:endParaRPr lang="en-US"/>
           </a:p>
@@ -759,7 +765,7 @@
           <a:p>
             <a:fld id="{E48D0C65-1297-4A36-9678-3688A302B186}" type="datetimeFigureOut">
               <a:rPr lang="en-US" smtClean="0"/>
-              <a:t>11/3/2015</a:t>
+              <a:t>2/15/2016</a:t>
             </a:fld>
             <a:endParaRPr lang="en-US"/>
           </a:p>
@@ -1005,7 +1011,7 @@
           <a:p>
             <a:fld id="{E48D0C65-1297-4A36-9678-3688A302B186}" type="datetimeFigureOut">
               <a:rPr lang="en-US" smtClean="0"/>
-              <a:t>11/3/2015</a:t>
+              <a:t>2/15/2016</a:t>
             </a:fld>
             <a:endParaRPr lang="en-US"/>
           </a:p>
@@ -1237,7 +1243,7 @@
           <a:p>
             <a:fld id="{E48D0C65-1297-4A36-9678-3688A302B186}" type="datetimeFigureOut">
               <a:rPr lang="en-US" smtClean="0"/>
-              <a:t>11/3/2015</a:t>
+              <a:t>2/15/2016</a:t>
             </a:fld>
             <a:endParaRPr lang="en-US"/>
           </a:p>
@@ -1604,7 +1610,7 @@
           <a:p>
             <a:fld id="{E48D0C65-1297-4A36-9678-3688A302B186}" type="datetimeFigureOut">
               <a:rPr lang="en-US" smtClean="0"/>
-              <a:t>11/3/2015</a:t>
+              <a:t>2/15/2016</a:t>
             </a:fld>
             <a:endParaRPr lang="en-US"/>
           </a:p>
@@ -1722,7 +1728,7 @@
           <a:p>
             <a:fld id="{E48D0C65-1297-4A36-9678-3688A302B186}" type="datetimeFigureOut">
               <a:rPr lang="en-US" smtClean="0"/>
-              <a:t>11/3/2015</a:t>
+              <a:t>2/15/2016</a:t>
             </a:fld>
             <a:endParaRPr lang="en-US"/>
           </a:p>
@@ -1817,7 +1823,7 @@
           <a:p>
             <a:fld id="{E48D0C65-1297-4A36-9678-3688A302B186}" type="datetimeFigureOut">
               <a:rPr lang="en-US" smtClean="0"/>
-              <a:t>11/3/2015</a:t>
+              <a:t>2/15/2016</a:t>
             </a:fld>
             <a:endParaRPr lang="en-US"/>
           </a:p>
@@ -2094,7 +2100,7 @@
           <a:p>
             <a:fld id="{E48D0C65-1297-4A36-9678-3688A302B186}" type="datetimeFigureOut">
               <a:rPr lang="en-US" smtClean="0"/>
-              <a:t>11/3/2015</a:t>
+              <a:t>2/15/2016</a:t>
             </a:fld>
             <a:endParaRPr lang="en-US"/>
           </a:p>
@@ -2347,7 +2353,7 @@
           <a:p>
             <a:fld id="{E48D0C65-1297-4A36-9678-3688A302B186}" type="datetimeFigureOut">
               <a:rPr lang="en-US" smtClean="0"/>
-              <a:t>11/3/2015</a:t>
+              <a:t>2/15/2016</a:t>
             </a:fld>
             <a:endParaRPr lang="en-US"/>
           </a:p>
@@ -2560,7 +2566,7 @@
           <a:p>
             <a:fld id="{E48D0C65-1297-4A36-9678-3688A302B186}" type="datetimeFigureOut">
               <a:rPr lang="en-US" smtClean="0"/>
-              <a:t>11/3/2015</a:t>
+              <a:t>2/15/2016</a:t>
             </a:fld>
             <a:endParaRPr lang="en-US"/>
           </a:p>
@@ -6253,7 +6259,6 @@
                 <a:rPr lang="en-US" dirty="0"/>
                 <a:t>7</a:t>
               </a:r>
-              <a:endParaRPr lang="en-US" dirty="0"/>
             </a:p>
           </p:txBody>
         </p:sp>
@@ -7176,6 +7181,404 @@
       </p:par>
     </p:tnLst>
   </p:timing>
+</p:sld>
+</file>
+
+<file path=ppt/slides/slide3.xml><?xml version="1.0" encoding="utf-8"?>
+<p:sld xmlns:a="http://schemas.openxmlformats.org/drawingml/2006/main" xmlns:r="http://schemas.openxmlformats.org/officeDocument/2006/relationships" xmlns:p="http://schemas.openxmlformats.org/presentationml/2006/main">
+  <p:cSld>
+    <p:spTree>
+      <p:nvGrpSpPr>
+        <p:cNvPr id="1" name=""/>
+        <p:cNvGrpSpPr/>
+        <p:nvPr/>
+      </p:nvGrpSpPr>
+      <p:grpSpPr>
+        <a:xfrm>
+          <a:off x="0" y="0"/>
+          <a:ext cx="0" cy="0"/>
+          <a:chOff x="0" y="0"/>
+          <a:chExt cx="0" cy="0"/>
+        </a:xfrm>
+      </p:grpSpPr>
+      <p:grpSp>
+        <p:nvGrpSpPr>
+          <p:cNvPr id="14" name="Group 13"/>
+          <p:cNvGrpSpPr/>
+          <p:nvPr/>
+        </p:nvGrpSpPr>
+        <p:grpSpPr>
+          <a:xfrm>
+            <a:off x="3177851" y="1445643"/>
+            <a:ext cx="5691020" cy="3717076"/>
+            <a:chOff x="3177851" y="1445643"/>
+            <a:chExt cx="5691020" cy="3717076"/>
+          </a:xfrm>
+        </p:grpSpPr>
+        <p:grpSp>
+          <p:nvGrpSpPr>
+            <p:cNvPr id="12" name="Group 11"/>
+            <p:cNvGrpSpPr/>
+            <p:nvPr/>
+          </p:nvGrpSpPr>
+          <p:grpSpPr>
+            <a:xfrm>
+              <a:off x="3374379" y="1747880"/>
+              <a:ext cx="5494492" cy="3414839"/>
+              <a:chOff x="3374379" y="1747880"/>
+              <a:chExt cx="5494492" cy="3414839"/>
+            </a:xfrm>
+          </p:grpSpPr>
+          <p:sp>
+            <p:nvSpPr>
+              <p:cNvPr id="4" name="Rounded Rectangle 3"/>
+              <p:cNvSpPr/>
+              <p:nvPr/>
+            </p:nvSpPr>
+            <p:spPr>
+              <a:xfrm>
+                <a:off x="3374379" y="1747880"/>
+                <a:ext cx="5494492" cy="3414839"/>
+              </a:xfrm>
+              <a:prstGeom prst="roundRect">
+                <a:avLst/>
+              </a:prstGeom>
+              <a:noFill/>
+              <a:ln w="57150">
+                <a:solidFill>
+                  <a:schemeClr val="tx1"/>
+                </a:solidFill>
+              </a:ln>
+            </p:spPr>
+            <p:style>
+              <a:lnRef idx="2">
+                <a:schemeClr val="accent1">
+                  <a:shade val="50000"/>
+                </a:schemeClr>
+              </a:lnRef>
+              <a:fillRef idx="1">
+                <a:schemeClr val="accent1"/>
+              </a:fillRef>
+              <a:effectRef idx="0">
+                <a:schemeClr val="accent1"/>
+              </a:effectRef>
+              <a:fontRef idx="minor">
+                <a:schemeClr val="lt1"/>
+              </a:fontRef>
+            </p:style>
+            <p:txBody>
+              <a:bodyPr rtlCol="0" anchor="ctr"/>
+              <a:lstStyle/>
+              <a:p>
+                <a:pPr algn="ctr"/>
+                <a:endParaRPr lang="en-US"/>
+              </a:p>
+            </p:txBody>
+          </p:sp>
+          <p:sp>
+            <p:nvSpPr>
+              <p:cNvPr id="5" name="Oval 4"/>
+              <p:cNvSpPr/>
+              <p:nvPr/>
+            </p:nvSpPr>
+            <p:spPr>
+              <a:xfrm>
+                <a:off x="4406116" y="2868628"/>
+                <a:ext cx="1723604" cy="1642683"/>
+              </a:xfrm>
+              <a:prstGeom prst="ellipse">
+                <a:avLst/>
+              </a:prstGeom>
+              <a:solidFill>
+                <a:srgbClr val="FF0000"/>
+              </a:solidFill>
+              <a:ln>
+                <a:solidFill>
+                  <a:srgbClr val="FF0000"/>
+                </a:solidFill>
+              </a:ln>
+            </p:spPr>
+            <p:style>
+              <a:lnRef idx="2">
+                <a:schemeClr val="accent1">
+                  <a:shade val="50000"/>
+                </a:schemeClr>
+              </a:lnRef>
+              <a:fillRef idx="1">
+                <a:schemeClr val="accent1"/>
+              </a:fillRef>
+              <a:effectRef idx="0">
+                <a:schemeClr val="accent1"/>
+              </a:effectRef>
+              <a:fontRef idx="minor">
+                <a:schemeClr val="lt1"/>
+              </a:fontRef>
+            </p:style>
+            <p:txBody>
+              <a:bodyPr rtlCol="0" anchor="ctr"/>
+              <a:lstStyle/>
+              <a:p>
+                <a:pPr algn="ctr"/>
+                <a:endParaRPr lang="en-US"/>
+              </a:p>
+            </p:txBody>
+          </p:sp>
+          <p:sp>
+            <p:nvSpPr>
+              <p:cNvPr id="6" name="Oval 5"/>
+              <p:cNvSpPr/>
+              <p:nvPr/>
+            </p:nvSpPr>
+            <p:spPr>
+              <a:xfrm>
+                <a:off x="5623968" y="2395242"/>
+                <a:ext cx="2249585" cy="2451887"/>
+              </a:xfrm>
+              <a:prstGeom prst="ellipse">
+                <a:avLst/>
+              </a:prstGeom>
+              <a:solidFill>
+                <a:srgbClr val="000000">
+                  <a:alpha val="50196"/>
+                </a:srgbClr>
+              </a:solidFill>
+              <a:ln>
+                <a:solidFill>
+                  <a:srgbClr val="000000"/>
+                </a:solidFill>
+              </a:ln>
+            </p:spPr>
+            <p:style>
+              <a:lnRef idx="2">
+                <a:schemeClr val="accent1">
+                  <a:shade val="50000"/>
+                </a:schemeClr>
+              </a:lnRef>
+              <a:fillRef idx="1">
+                <a:schemeClr val="accent1"/>
+              </a:fillRef>
+              <a:effectRef idx="0">
+                <a:schemeClr val="accent1"/>
+              </a:effectRef>
+              <a:fontRef idx="minor">
+                <a:schemeClr val="lt1"/>
+              </a:fontRef>
+            </p:style>
+            <p:txBody>
+              <a:bodyPr rtlCol="0" anchor="ctr"/>
+              <a:lstStyle/>
+              <a:p>
+                <a:pPr algn="ctr"/>
+                <a:endParaRPr lang="en-US"/>
+              </a:p>
+            </p:txBody>
+          </p:sp>
+          <p:sp>
+            <p:nvSpPr>
+              <p:cNvPr id="7" name="TextBox 6"/>
+              <p:cNvSpPr txBox="1"/>
+              <p:nvPr/>
+            </p:nvSpPr>
+            <p:spPr>
+              <a:xfrm>
+                <a:off x="4106118" y="2607018"/>
+                <a:ext cx="393056" cy="523220"/>
+              </a:xfrm>
+              <a:prstGeom prst="rect">
+                <a:avLst/>
+              </a:prstGeom>
+              <a:noFill/>
+            </p:spPr>
+            <p:txBody>
+              <a:bodyPr wrap="none" rtlCol="0">
+                <a:spAutoFit/>
+              </a:bodyPr>
+              <a:lstStyle/>
+              <a:p>
+                <a:r>
+                  <a:rPr lang="en-CA" sz="2800" dirty="0" smtClean="0">
+                    <a:solidFill>
+                      <a:srgbClr val="FF0000"/>
+                    </a:solidFill>
+                  </a:rPr>
+                  <a:t>A</a:t>
+                </a:r>
+                <a:endParaRPr lang="en-US" sz="2800" dirty="0">
+                  <a:solidFill>
+                    <a:srgbClr val="FF0000"/>
+                  </a:solidFill>
+                </a:endParaRPr>
+              </a:p>
+            </p:txBody>
+          </p:sp>
+          <p:sp>
+            <p:nvSpPr>
+              <p:cNvPr id="8" name="TextBox 7"/>
+              <p:cNvSpPr txBox="1"/>
+              <p:nvPr/>
+            </p:nvSpPr>
+            <p:spPr>
+              <a:xfrm>
+                <a:off x="7621650" y="2308343"/>
+                <a:ext cx="393056" cy="523220"/>
+              </a:xfrm>
+              <a:prstGeom prst="rect">
+                <a:avLst/>
+              </a:prstGeom>
+              <a:noFill/>
+            </p:spPr>
+            <p:txBody>
+              <a:bodyPr wrap="none" rtlCol="0">
+                <a:spAutoFit/>
+              </a:bodyPr>
+              <a:lstStyle/>
+              <a:p>
+                <a:r>
+                  <a:rPr lang="en-CA" sz="2800" dirty="0" smtClean="0">
+                    <a:solidFill>
+                      <a:schemeClr val="tx1">
+                        <a:lumMod val="50000"/>
+                        <a:lumOff val="50000"/>
+                      </a:schemeClr>
+                    </a:solidFill>
+                  </a:rPr>
+                  <a:t>B</a:t>
+                </a:r>
+                <a:endParaRPr lang="en-US" sz="2800" dirty="0">
+                  <a:solidFill>
+                    <a:schemeClr val="tx1">
+                      <a:lumMod val="50000"/>
+                      <a:lumOff val="50000"/>
+                    </a:schemeClr>
+                  </a:solidFill>
+                </a:endParaRPr>
+              </a:p>
+            </p:txBody>
+          </p:sp>
+          <p:sp>
+            <p:nvSpPr>
+              <p:cNvPr id="9" name="TextBox 8"/>
+              <p:cNvSpPr txBox="1"/>
+              <p:nvPr/>
+            </p:nvSpPr>
+            <p:spPr>
+              <a:xfrm>
+                <a:off x="5267918" y="1967328"/>
+                <a:ext cx="1003801" cy="523220"/>
+              </a:xfrm>
+              <a:prstGeom prst="rect">
+                <a:avLst/>
+              </a:prstGeom>
+              <a:noFill/>
+            </p:spPr>
+            <p:txBody>
+              <a:bodyPr wrap="none" rtlCol="0">
+                <a:spAutoFit/>
+              </a:bodyPr>
+              <a:lstStyle/>
+              <a:p>
+                <a:r>
+                  <a:rPr lang="en-CA" sz="2800" dirty="0" smtClean="0">
+                    <a:solidFill>
+                      <a:schemeClr val="tx1">
+                        <a:lumMod val="65000"/>
+                        <a:lumOff val="35000"/>
+                      </a:schemeClr>
+                    </a:solidFill>
+                  </a:rPr>
+                  <a:t>A ∩ B</a:t>
+                </a:r>
+                <a:endParaRPr lang="en-US" sz="2800" dirty="0">
+                  <a:solidFill>
+                    <a:schemeClr val="tx1">
+                      <a:lumMod val="65000"/>
+                      <a:lumOff val="35000"/>
+                    </a:schemeClr>
+                  </a:solidFill>
+                </a:endParaRPr>
+              </a:p>
+            </p:txBody>
+          </p:sp>
+          <p:cxnSp>
+            <p:nvCxnSpPr>
+              <p:cNvPr id="11" name="Straight Arrow Connector 10"/>
+              <p:cNvCxnSpPr>
+                <a:stCxn id="9" idx="2"/>
+              </p:cNvCxnSpPr>
+              <p:nvPr/>
+            </p:nvCxnSpPr>
+            <p:spPr>
+              <a:xfrm>
+                <a:off x="5769819" y="2490548"/>
+                <a:ext cx="52073" cy="1019818"/>
+              </a:xfrm>
+              <a:prstGeom prst="straightConnector1">
+                <a:avLst/>
+              </a:prstGeom>
+              <a:ln w="76200">
+                <a:solidFill>
+                  <a:schemeClr val="tx1"/>
+                </a:solidFill>
+                <a:tailEnd type="triangle"/>
+              </a:ln>
+            </p:spPr>
+            <p:style>
+              <a:lnRef idx="1">
+                <a:schemeClr val="accent1"/>
+              </a:lnRef>
+              <a:fillRef idx="0">
+                <a:schemeClr val="accent1"/>
+              </a:fillRef>
+              <a:effectRef idx="0">
+                <a:schemeClr val="accent1"/>
+              </a:effectRef>
+              <a:fontRef idx="minor">
+                <a:schemeClr val="tx1"/>
+              </a:fontRef>
+            </p:style>
+          </p:cxnSp>
+        </p:grpSp>
+        <p:sp>
+          <p:nvSpPr>
+            <p:cNvPr id="13" name="TextBox 12"/>
+            <p:cNvSpPr txBox="1"/>
+            <p:nvPr/>
+          </p:nvSpPr>
+          <p:spPr>
+            <a:xfrm>
+              <a:off x="3177851" y="1445643"/>
+              <a:ext cx="349776" cy="523220"/>
+            </a:xfrm>
+            <a:prstGeom prst="rect">
+              <a:avLst/>
+            </a:prstGeom>
+            <a:noFill/>
+          </p:spPr>
+          <p:txBody>
+            <a:bodyPr wrap="none" rtlCol="0">
+              <a:spAutoFit/>
+            </a:bodyPr>
+            <a:lstStyle/>
+            <a:p>
+              <a:r>
+                <a:rPr lang="en-CA" sz="2800" dirty="0" smtClean="0"/>
+                <a:t>S</a:t>
+              </a:r>
+              <a:endParaRPr lang="en-US" sz="2800" dirty="0"/>
+            </a:p>
+          </p:txBody>
+        </p:sp>
+      </p:grpSp>
+    </p:spTree>
+    <p:extLst>
+      <p:ext uri="{BB962C8B-B14F-4D97-AF65-F5344CB8AC3E}">
+        <p14:creationId xmlns:p14="http://schemas.microsoft.com/office/powerpoint/2010/main" val="4106573816"/>
+      </p:ext>
+    </p:extLst>
+  </p:cSld>
+  <p:clrMapOvr>
+    <a:masterClrMapping/>
+  </p:clrMapOvr>
 </p:sld>
 </file>
 

</xml_diff>